<commit_message>
Last change to the presentation, I promise.
</commit_message>
<xml_diff>
--- a/presentation/Travel expert presentation_Group5-John-Megha-Brian-Mahmood.pptx
+++ b/presentation/Travel expert presentation_Group5-John-Megha-Brian-Mahmood.pptx
@@ -5,7 +5,7 @@
     <p:sldMasterId id="2147483648" r:id="rId1"/>
   </p:sldMasterIdLst>
   <p:notesMasterIdLst>
-    <p:notesMasterId r:id="rId17"/>
+    <p:notesMasterId r:id="rId16"/>
   </p:notesMasterIdLst>
   <p:sldIdLst>
     <p:sldId id="322" r:id="rId2"/>
@@ -21,8 +21,7 @@
     <p:sldId id="335" r:id="rId12"/>
     <p:sldId id="349" r:id="rId13"/>
     <p:sldId id="336" r:id="rId14"/>
-    <p:sldId id="351" r:id="rId15"/>
-    <p:sldId id="321" r:id="rId16"/>
+    <p:sldId id="321" r:id="rId15"/>
   </p:sldIdLst>
   <p:sldSz cx="9144000" cy="6858000" type="screen4x3"/>
   <p:notesSz cx="6858000" cy="9144000"/>
@@ -3232,8 +3231,8 @@
         </p:nvSpPr>
         <p:spPr>
           <a:xfrm>
-            <a:off x="-34073" y="0"/>
-            <a:ext cx="9152906" cy="6172200"/>
+            <a:off x="0" y="8467"/>
+            <a:ext cx="9144000" cy="6172200"/>
           </a:xfrm>
           <a:prstGeom prst="rect">
             <a:avLst/>
@@ -3343,36 +3342,6 @@
           </a:p>
         </p:txBody>
       </p:sp>
-      <p:pic>
-        <p:nvPicPr>
-          <p:cNvPr id="2" name="Picture 1"/>
-          <p:cNvPicPr>
-            <a:picLocks noChangeAspect="1"/>
-          </p:cNvPicPr>
-          <p:nvPr userDrawn="1"/>
-        </p:nvPicPr>
-        <p:blipFill>
-          <a:blip r:embed="rId2">
-            <a:extLst>
-              <a:ext uri="{28A0092B-C50C-407E-A947-70E740481C1C}">
-                <a14:useLocalDpi xmlns:a14="http://schemas.microsoft.com/office/drawing/2010/main" val="0"/>
-              </a:ext>
-            </a:extLst>
-          </a:blip>
-          <a:stretch>
-            <a:fillRect/>
-          </a:stretch>
-        </p:blipFill>
-        <p:spPr>
-          <a:xfrm>
-            <a:off x="2514600" y="1885950"/>
-            <a:ext cx="3810000" cy="2400300"/>
-          </a:xfrm>
-          <a:prstGeom prst="rect">
-            <a:avLst/>
-          </a:prstGeom>
-        </p:spPr>
-      </p:pic>
     </p:spTree>
     <p:extLst>
       <p:ext uri="{BB962C8B-B14F-4D97-AF65-F5344CB8AC3E}">
@@ -11455,7 +11424,7 @@
           <a:noFill/>
           <a:ln w="28575" cmpd="sng">
             <a:solidFill>
-              <a:srgbClr val="00B0F0"/>
+              <a:srgbClr val="2F74C3"/>
             </a:solidFill>
           </a:ln>
         </p:spPr>
@@ -11503,7 +11472,7 @@
           <a:noFill/>
           <a:ln w="28575" cmpd="sng">
             <a:solidFill>
-              <a:srgbClr val="00B0F0"/>
+              <a:srgbClr val="2F74C3"/>
             </a:solidFill>
           </a:ln>
         </p:spPr>
@@ -11555,7 +11524,7 @@
           <a:noFill/>
           <a:ln w="28575" cmpd="sng">
             <a:solidFill>
-              <a:srgbClr val="00B0F0"/>
+              <a:srgbClr val="2F74C3"/>
             </a:solidFill>
           </a:ln>
         </p:spPr>
@@ -11603,7 +11572,7 @@
           <a:noFill/>
           <a:ln w="28575" cmpd="sng">
             <a:solidFill>
-              <a:srgbClr val="00B0F0"/>
+              <a:srgbClr val="2F74C3"/>
             </a:solidFill>
           </a:ln>
         </p:spPr>
@@ -16520,7 +16489,7 @@
             <a:lvl1pPr algn="r">
               <a:defRPr sz="1800" b="1">
                 <a:solidFill>
-                  <a:srgbClr val="00B0F0"/>
+                  <a:srgbClr val="2F74C3"/>
                 </a:solidFill>
                 <a:latin typeface="Open Sans" pitchFamily="34" charset="0"/>
                 <a:ea typeface="Open Sans" pitchFamily="34" charset="0"/>
@@ -17406,26 +17375,16 @@
             <a:r>
               <a:rPr lang="en-US" sz="3600" dirty="0" smtClean="0">
                 <a:solidFill>
-                  <a:schemeClr val="accent1"/>
+                  <a:srgbClr val="2F74C3"/>
                 </a:solidFill>
                 <a:latin typeface="Open Sans Extrabold"/>
                 <a:cs typeface="Open Sans Extrabold"/>
               </a:rPr>
-              <a:t>Travel </a:t>
-            </a:r>
-            <a:r>
-              <a:rPr lang="en-US" sz="3600" dirty="0" smtClean="0">
-                <a:solidFill>
-                  <a:schemeClr val="accent1"/>
-                </a:solidFill>
-                <a:latin typeface="Open Sans Extrabold"/>
-                <a:cs typeface="Open Sans Extrabold"/>
-              </a:rPr>
-              <a:t>Experts</a:t>
+              <a:t>The Travel Experts Inc.</a:t>
             </a:r>
             <a:endParaRPr lang="en-US" sz="3600" dirty="0">
               <a:solidFill>
-                <a:schemeClr val="accent1"/>
+                <a:srgbClr val="2F74C3"/>
               </a:solidFill>
               <a:latin typeface="Open Sans Extrabold"/>
               <a:cs typeface="Open Sans Extrabold"/>
@@ -17458,16 +17417,26 @@
             <a:r>
               <a:rPr lang="en-US" sz="2800" dirty="0" smtClean="0">
                 <a:solidFill>
-                  <a:schemeClr val="accent1"/>
+                  <a:srgbClr val="2F74C3"/>
                 </a:solidFill>
                 <a:latin typeface="Open Sans Light"/>
                 <a:cs typeface="Open Sans Light"/>
               </a:rPr>
-              <a:t>Software Project</a:t>
+              <a:t>Software </a:t>
+            </a:r>
+            <a:r>
+              <a:rPr lang="en-US" sz="2800" dirty="0" smtClean="0">
+                <a:solidFill>
+                  <a:srgbClr val="2F74C3"/>
+                </a:solidFill>
+                <a:latin typeface="Open Sans Light"/>
+                <a:cs typeface="Open Sans Light"/>
+              </a:rPr>
+              <a:t>Package Project Proposal</a:t>
             </a:r>
             <a:endParaRPr lang="en-US" sz="2800" dirty="0">
               <a:solidFill>
-                <a:schemeClr val="accent1"/>
+                <a:srgbClr val="2F74C3"/>
               </a:solidFill>
               <a:latin typeface="Open Sans Light"/>
               <a:cs typeface="Open Sans Light"/>
@@ -17658,17 +17627,7 @@
                 <a:latin typeface="Open Sans Extrabold"/>
                 <a:cs typeface="Open Sans Extrabold"/>
               </a:rPr>
-              <a:t>Presented by: </a:t>
-            </a:r>
-            <a:r>
-              <a:rPr lang="en-US" sz="1800" dirty="0" smtClean="0">
-                <a:solidFill>
-                  <a:schemeClr val="accent1"/>
-                </a:solidFill>
-                <a:latin typeface="Open Sans Extrabold"/>
-                <a:cs typeface="Open Sans Extrabold"/>
-              </a:rPr>
-              <a:t>John, </a:t>
+              <a:t>Presented by: John, </a:t>
             </a:r>
             <a:r>
               <a:rPr lang="en-US" sz="1800" dirty="0" err="1" smtClean="0">
@@ -18089,7 +18048,7 @@
       </p:sp>
       <p:pic>
         <p:nvPicPr>
-          <p:cNvPr id="6" name="Picture 5"/>
+          <p:cNvPr id="8" name="Picture 7"/>
           <p:cNvPicPr>
             <a:picLocks noChangeAspect="1"/>
           </p:cNvPicPr>
@@ -18109,8 +18068,8 @@
         </p:blipFill>
         <p:spPr>
           <a:xfrm>
-            <a:off x="2725102" y="1107360"/>
-            <a:ext cx="3571875" cy="800100"/>
+            <a:off x="1557337" y="1243330"/>
+            <a:ext cx="6029325" cy="1076325"/>
           </a:xfrm>
           <a:prstGeom prst="rect">
             <a:avLst/>
@@ -18189,14 +18148,22 @@
             <a:r>
               <a:rPr lang="en-US" sz="3600" dirty="0" smtClean="0">
                 <a:solidFill>
-                  <a:schemeClr val="accent1"/>
+                  <a:srgbClr val="2F74C3"/>
                 </a:solidFill>
               </a:rPr>
-              <a:t>Use Case diagram</a:t>
+              <a:t>Use Case </a:t>
+            </a:r>
+            <a:r>
+              <a:rPr lang="en-US" sz="3600" dirty="0" smtClean="0">
+                <a:solidFill>
+                  <a:srgbClr val="2F74C3"/>
+                </a:solidFill>
+              </a:rPr>
+              <a:t>Diagram</a:t>
             </a:r>
             <a:endParaRPr lang="en-US" sz="3600" dirty="0">
               <a:solidFill>
-                <a:schemeClr val="accent1"/>
+                <a:srgbClr val="2F74C3"/>
               </a:solidFill>
             </a:endParaRPr>
           </a:p>
@@ -18347,12 +18314,23 @@
             <a:r>
               <a:rPr lang="en-JM" sz="4400" dirty="0" smtClean="0">
                 <a:solidFill>
-                  <a:srgbClr val="00B0F0"/>
+                  <a:srgbClr val="2F74C3"/>
                 </a:solidFill>
               </a:rPr>
-              <a:t>Scope definition</a:t>
+              <a:t>Scope </a:t>
+            </a:r>
+            <a:r>
+              <a:rPr lang="en-JM" sz="4400" dirty="0" smtClean="0">
+                <a:solidFill>
+                  <a:srgbClr val="2F74C3"/>
+                </a:solidFill>
+              </a:rPr>
+              <a:t>Definition</a:t>
             </a:r>
             <a:endParaRPr lang="en-JM" sz="4400" dirty="0">
+              <a:solidFill>
+                <a:srgbClr val="2F74C3"/>
+              </a:solidFill>
               <a:latin typeface="Open Sans Light" pitchFamily="34" charset="0"/>
               <a:ea typeface="Open Sans Light" pitchFamily="34" charset="0"/>
               <a:cs typeface="Open Sans Light" pitchFamily="34" charset="0"/>
@@ -18439,14 +18417,7 @@
                 <a:latin typeface="Calibri"/>
                 <a:cs typeface="Calibri"/>
               </a:rPr>
-              <a:t>Database </a:t>
-            </a:r>
-            <a:r>
-              <a:rPr lang="en-JM" sz="2000" dirty="0" smtClean="0">
-                <a:latin typeface="Calibri"/>
-                <a:cs typeface="Calibri"/>
-              </a:rPr>
-              <a:t>Design</a:t>
+              <a:t>Database Design</a:t>
             </a:r>
             <a:endParaRPr lang="en-JM" sz="2000" dirty="0">
               <a:latin typeface="Calibri"/>
@@ -18477,14 +18448,7 @@
                 <a:latin typeface="Calibri"/>
                 <a:cs typeface="Calibri"/>
               </a:rPr>
-              <a:t>Application </a:t>
-            </a:r>
-            <a:r>
-              <a:rPr lang="en-JM" sz="2000" dirty="0" smtClean="0">
-                <a:latin typeface="Calibri"/>
-                <a:cs typeface="Calibri"/>
-              </a:rPr>
-              <a:t>Development</a:t>
+              <a:t>Application Development</a:t>
             </a:r>
             <a:endParaRPr lang="en-JM" sz="2000" dirty="0">
               <a:latin typeface="Calibri"/>
@@ -18517,10 +18481,6 @@
               </a:rPr>
               <a:t>Web-Based Menu</a:t>
             </a:r>
-            <a:endParaRPr lang="en-JM" sz="2000" dirty="0" smtClean="0">
-              <a:latin typeface="Calibri"/>
-              <a:cs typeface="Calibri"/>
-            </a:endParaRPr>
           </a:p>
           <a:p>
             <a:pPr lvl="0">
@@ -18546,26 +18506,8 @@
                 <a:latin typeface="Calibri"/>
                 <a:cs typeface="Calibri"/>
               </a:rPr>
-              <a:t>Web-Based Reports </a:t>
-            </a:r>
-            <a:r>
-              <a:rPr lang="en-JM" sz="2000" dirty="0" smtClean="0">
-                <a:latin typeface="Calibri"/>
-                <a:cs typeface="Calibri"/>
-              </a:rPr>
-              <a:t>&amp; </a:t>
-            </a:r>
-            <a:r>
-              <a:rPr lang="en-JM" sz="2000" dirty="0" smtClean="0">
-                <a:latin typeface="Calibri"/>
-                <a:cs typeface="Calibri"/>
-              </a:rPr>
-              <a:t>Analytics</a:t>
-            </a:r>
-            <a:endParaRPr lang="en-JM" sz="2000" dirty="0" smtClean="0">
-              <a:latin typeface="Calibri"/>
-              <a:cs typeface="Calibri"/>
-            </a:endParaRPr>
+              <a:t>Web-Based Reports &amp; Analytics</a:t>
+            </a:r>
           </a:p>
           <a:p>
             <a:pPr lvl="0">
@@ -18591,14 +18533,7 @@
                 <a:latin typeface="Calibri"/>
                 <a:cs typeface="Calibri"/>
               </a:rPr>
-              <a:t>Placing </a:t>
-            </a:r>
-            <a:r>
-              <a:rPr lang="en-JM" sz="2000" dirty="0" smtClean="0">
-                <a:latin typeface="Calibri"/>
-                <a:cs typeface="Calibri"/>
-              </a:rPr>
-              <a:t>Orders Online</a:t>
+              <a:t>Placing Orders Online</a:t>
             </a:r>
             <a:endParaRPr lang="en-JM" sz="2000" dirty="0">
               <a:latin typeface="Calibri"/>
@@ -18616,6 +18551,36 @@
           </a:p>
         </p:txBody>
       </p:sp>
+      <p:pic>
+        <p:nvPicPr>
+          <p:cNvPr id="6" name="Picture 5"/>
+          <p:cNvPicPr>
+            <a:picLocks noChangeAspect="1"/>
+          </p:cNvPicPr>
+          <p:nvPr/>
+        </p:nvPicPr>
+        <p:blipFill>
+          <a:blip r:embed="rId2">
+            <a:extLst>
+              <a:ext uri="{28A0092B-C50C-407E-A947-70E740481C1C}">
+                <a14:useLocalDpi xmlns:a14="http://schemas.microsoft.com/office/drawing/2010/main" val="0"/>
+              </a:ext>
+            </a:extLst>
+          </a:blip>
+          <a:stretch>
+            <a:fillRect/>
+          </a:stretch>
+        </p:blipFill>
+        <p:spPr>
+          <a:xfrm>
+            <a:off x="4868333" y="1651000"/>
+            <a:ext cx="3894667" cy="2921000"/>
+          </a:xfrm>
+          <a:prstGeom prst="rect">
+            <a:avLst/>
+          </a:prstGeom>
+        </p:spPr>
+      </p:pic>
     </p:spTree>
     <p:extLst>
       <p:ext uri="{BB962C8B-B14F-4D97-AF65-F5344CB8AC3E}">
@@ -18677,7 +18642,7 @@
         </p:nvSpPr>
         <p:spPr>
           <a:xfrm>
-            <a:off x="304800" y="914400"/>
+            <a:off x="304800" y="533400"/>
             <a:ext cx="8229600" cy="1143000"/>
           </a:xfrm>
         </p:spPr>
@@ -18688,14 +18653,14 @@
             <a:r>
               <a:rPr lang="en-US" dirty="0" smtClean="0">
                 <a:solidFill>
-                  <a:schemeClr val="accent1"/>
+                  <a:srgbClr val="2F74C3"/>
                 </a:solidFill>
               </a:rPr>
-              <a:t>LIVE DEMO</a:t>
-            </a:r>
-            <a:endParaRPr lang="en-US" dirty="0">
+              <a:t>Live Demonstration</a:t>
+            </a:r>
+            <a:endParaRPr lang="en-US" sz="4000" dirty="0">
               <a:solidFill>
-                <a:schemeClr val="accent1"/>
+                <a:srgbClr val="2F74C3"/>
               </a:solidFill>
             </a:endParaRPr>
           </a:p>
@@ -18747,6 +18712,189 @@
           </a:p>
         </p:txBody>
       </p:sp>
+      <p:pic>
+        <p:nvPicPr>
+          <p:cNvPr id="5" name="Picture 4"/>
+          <p:cNvPicPr>
+            <a:picLocks noChangeAspect="1"/>
+          </p:cNvPicPr>
+          <p:nvPr/>
+        </p:nvPicPr>
+        <p:blipFill>
+          <a:blip r:embed="rId2" cstate="print">
+            <a:extLst>
+              <a:ext uri="{28A0092B-C50C-407E-A947-70E740481C1C}">
+                <a14:useLocalDpi xmlns:a14="http://schemas.microsoft.com/office/drawing/2010/main" val="0"/>
+              </a:ext>
+            </a:extLst>
+          </a:blip>
+          <a:stretch>
+            <a:fillRect/>
+          </a:stretch>
+        </p:blipFill>
+        <p:spPr>
+          <a:xfrm>
+            <a:off x="6908440" y="1975758"/>
+            <a:ext cx="1778360" cy="3358242"/>
+          </a:xfrm>
+          <a:prstGeom prst="rect">
+            <a:avLst/>
+          </a:prstGeom>
+        </p:spPr>
+      </p:pic>
+      <p:pic>
+        <p:nvPicPr>
+          <p:cNvPr id="6" name="Picture 5" descr="iMac-mock-up-diferents-views.png"/>
+          <p:cNvPicPr>
+            <a:picLocks noChangeAspect="1"/>
+          </p:cNvPicPr>
+          <p:nvPr/>
+        </p:nvPicPr>
+        <p:blipFill>
+          <a:blip r:embed="rId3">
+            <a:extLst>
+              <a:ext uri="{28A0092B-C50C-407E-A947-70E740481C1C}">
+                <a14:useLocalDpi xmlns:a14="http://schemas.microsoft.com/office/drawing/2010/main" val="0"/>
+              </a:ext>
+            </a:extLst>
+          </a:blip>
+          <a:stretch>
+            <a:fillRect/>
+          </a:stretch>
+        </p:blipFill>
+        <p:spPr>
+          <a:xfrm>
+            <a:off x="363348" y="2009624"/>
+            <a:ext cx="3901032" cy="3242733"/>
+          </a:xfrm>
+          <a:prstGeom prst="rect">
+            <a:avLst/>
+          </a:prstGeom>
+        </p:spPr>
+      </p:pic>
+      <p:pic>
+        <p:nvPicPr>
+          <p:cNvPr id="7" name="Picture 6"/>
+          <p:cNvPicPr>
+            <a:picLocks noChangeAspect="1"/>
+          </p:cNvPicPr>
+          <p:nvPr/>
+        </p:nvPicPr>
+        <p:blipFill>
+          <a:blip r:embed="rId4" cstate="print">
+            <a:extLst>
+              <a:ext uri="{28A0092B-C50C-407E-A947-70E740481C1C}">
+                <a14:useLocalDpi xmlns:a14="http://schemas.microsoft.com/office/drawing/2010/main" val="0"/>
+              </a:ext>
+            </a:extLst>
+          </a:blip>
+          <a:stretch>
+            <a:fillRect/>
+          </a:stretch>
+        </p:blipFill>
+        <p:spPr>
+          <a:xfrm>
+            <a:off x="4306900" y="1905000"/>
+            <a:ext cx="2423740" cy="3429000"/>
+          </a:xfrm>
+          <a:prstGeom prst="rect">
+            <a:avLst/>
+          </a:prstGeom>
+        </p:spPr>
+      </p:pic>
+      <p:pic>
+        <p:nvPicPr>
+          <p:cNvPr id="8" name="Picture Placeholder 18"/>
+          <p:cNvPicPr>
+            <a:picLocks noChangeAspect="1"/>
+          </p:cNvPicPr>
+          <p:nvPr/>
+        </p:nvPicPr>
+        <p:blipFill>
+          <a:blip r:embed="rId5" cstate="print">
+            <a:extLst>
+              <a:ext uri="{28A0092B-C50C-407E-A947-70E740481C1C}">
+                <a14:useLocalDpi xmlns:a14="http://schemas.microsoft.com/office/drawing/2010/main" val="0"/>
+              </a:ext>
+            </a:extLst>
+          </a:blip>
+          <a:srcRect l="2334" r="2334"/>
+          <a:stretch>
+            <a:fillRect/>
+          </a:stretch>
+        </p:blipFill>
+        <p:spPr>
+          <a:xfrm>
+            <a:off x="609043" y="2204358"/>
+            <a:ext cx="3429000" cy="2133600"/>
+          </a:xfrm>
+          <a:prstGeom prst="rect">
+            <a:avLst/>
+          </a:prstGeom>
+        </p:spPr>
+      </p:pic>
+      <p:pic>
+        <p:nvPicPr>
+          <p:cNvPr id="9" name="Picture Placeholder 34"/>
+          <p:cNvPicPr>
+            <a:picLocks noChangeAspect="1"/>
+          </p:cNvPicPr>
+          <p:nvPr/>
+        </p:nvPicPr>
+        <p:blipFill>
+          <a:blip r:embed="rId6" cstate="print">
+            <a:extLst>
+              <a:ext uri="{28A0092B-C50C-407E-A947-70E740481C1C}">
+                <a14:useLocalDpi xmlns:a14="http://schemas.microsoft.com/office/drawing/2010/main" val="0"/>
+              </a:ext>
+            </a:extLst>
+          </a:blip>
+          <a:srcRect l="70" r="70"/>
+          <a:stretch>
+            <a:fillRect/>
+          </a:stretch>
+        </p:blipFill>
+        <p:spPr>
+          <a:xfrm>
+            <a:off x="7147235" y="2529710"/>
+            <a:ext cx="1234765" cy="2179579"/>
+          </a:xfrm>
+          <a:prstGeom prst="rect">
+            <a:avLst/>
+          </a:prstGeom>
+        </p:spPr>
+      </p:pic>
+      <p:pic>
+        <p:nvPicPr>
+          <p:cNvPr id="10" name="Picture Placeholder 40"/>
+          <p:cNvPicPr>
+            <a:picLocks noChangeAspect="1"/>
+          </p:cNvPicPr>
+          <p:nvPr/>
+        </p:nvPicPr>
+        <p:blipFill>
+          <a:blip r:embed="rId7" cstate="print">
+            <a:extLst>
+              <a:ext uri="{28A0092B-C50C-407E-A947-70E740481C1C}">
+                <a14:useLocalDpi xmlns:a14="http://schemas.microsoft.com/office/drawing/2010/main" val="0"/>
+              </a:ext>
+            </a:extLst>
+          </a:blip>
+          <a:srcRect l="667" r="667"/>
+          <a:stretch>
+            <a:fillRect/>
+          </a:stretch>
+        </p:blipFill>
+        <p:spPr>
+          <a:xfrm>
+            <a:off x="4648200" y="2281937"/>
+            <a:ext cx="1828800" cy="2484438"/>
+          </a:xfrm>
+          <a:prstGeom prst="rect">
+            <a:avLst/>
+          </a:prstGeom>
+        </p:spPr>
+      </p:pic>
     </p:spTree>
     <p:extLst>
       <p:ext uri="{BB962C8B-B14F-4D97-AF65-F5344CB8AC3E}">
@@ -18816,12 +18964,15 @@
             <a:r>
               <a:rPr lang="en-JM" sz="4400" dirty="0" smtClean="0">
                 <a:solidFill>
-                  <a:srgbClr val="00B0F0"/>
+                  <a:srgbClr val="2F74C3"/>
                 </a:solidFill>
               </a:rPr>
               <a:t>Future Implementation</a:t>
             </a:r>
             <a:endParaRPr lang="en-JM" sz="4400" dirty="0">
+              <a:solidFill>
+                <a:srgbClr val="2F74C3"/>
+              </a:solidFill>
               <a:latin typeface="Open Sans Light" pitchFamily="34" charset="0"/>
               <a:ea typeface="Open Sans Light" pitchFamily="34" charset="0"/>
               <a:cs typeface="Open Sans Light" pitchFamily="34" charset="0"/>
@@ -18968,10 +19119,6 @@
               </a:rPr>
               <a:t>Multiple currency capabilities</a:t>
             </a:r>
-            <a:endParaRPr lang="en-JM" sz="2000" dirty="0" smtClean="0">
-              <a:latin typeface="Calibri"/>
-              <a:cs typeface="Calibri"/>
-            </a:endParaRPr>
           </a:p>
           <a:p>
             <a:pPr lvl="0">
@@ -18997,14 +19144,7 @@
                 <a:latin typeface="Calibri"/>
                 <a:cs typeface="Calibri"/>
               </a:rPr>
-              <a:t>Comprehensive </a:t>
-            </a:r>
-            <a:r>
-              <a:rPr lang="en-JM" sz="2000" dirty="0" smtClean="0">
-                <a:latin typeface="Calibri"/>
-                <a:cs typeface="Calibri"/>
-              </a:rPr>
-              <a:t>travel packages (flights, hotels, vehicles, etc.)</a:t>
+              <a:t>Comprehensive travel packages (flights, hotels, vehicles, etc.)</a:t>
             </a:r>
           </a:p>
           <a:p>
@@ -19032,7 +19172,41 @@
                 <a:latin typeface="Calibri"/>
                 <a:cs typeface="Calibri"/>
               </a:rPr>
-              <a:t>Live customer support integration</a:t>
+              <a:t>Live customer support </a:t>
+            </a:r>
+            <a:r>
+              <a:rPr lang="en-JM" sz="2000" dirty="0" smtClean="0">
+                <a:latin typeface="Calibri"/>
+                <a:cs typeface="Calibri"/>
+              </a:rPr>
+              <a:t>integration</a:t>
+            </a:r>
+          </a:p>
+          <a:p>
+            <a:pPr lvl="0">
+              <a:spcBef>
+                <a:spcPts val="0"/>
+              </a:spcBef>
+              <a:defRPr/>
+            </a:pPr>
+            <a:endParaRPr lang="en-JM" sz="2000" dirty="0">
+              <a:latin typeface="Calibri"/>
+              <a:cs typeface="Calibri"/>
+            </a:endParaRPr>
+          </a:p>
+          <a:p>
+            <a:pPr lvl="0">
+              <a:spcBef>
+                <a:spcPts val="0"/>
+              </a:spcBef>
+              <a:defRPr/>
+            </a:pPr>
+            <a:r>
+              <a:rPr lang="en-JM" sz="2000" dirty="0" smtClean="0">
+                <a:latin typeface="Calibri"/>
+                <a:cs typeface="Calibri"/>
+              </a:rPr>
+              <a:t>Completely virtual travel agency</a:t>
             </a:r>
             <a:endParaRPr lang="en-JM" sz="2000" dirty="0">
               <a:latin typeface="Calibri"/>
@@ -19047,35 +19221,6 @@
               <a:defRPr/>
             </a:pPr>
             <a:endParaRPr lang="en-JM" sz="2000" dirty="0" smtClean="0">
-              <a:latin typeface="Calibri"/>
-              <a:cs typeface="Calibri"/>
-            </a:endParaRPr>
-          </a:p>
-          <a:p>
-            <a:pPr lvl="0">
-              <a:spcBef>
-                <a:spcPts val="0"/>
-              </a:spcBef>
-              <a:defRPr/>
-            </a:pPr>
-            <a:r>
-              <a:rPr lang="en-JM" sz="2000" dirty="0" smtClean="0">
-                <a:cs typeface="Calibri"/>
-              </a:rPr>
-              <a:t>Responsive </a:t>
-            </a:r>
-            <a:r>
-              <a:rPr lang="en-JM" sz="2000" dirty="0">
-                <a:cs typeface="Calibri"/>
-              </a:rPr>
-              <a:t>Design for multi-platform use</a:t>
-            </a:r>
-          </a:p>
-          <a:p>
-            <a:pPr marL="0" indent="0">
-              <a:buNone/>
-            </a:pPr>
-            <a:endParaRPr lang="en-JM" sz="1800" dirty="0">
               <a:latin typeface="Calibri"/>
               <a:cs typeface="Calibri"/>
             </a:endParaRPr>
@@ -19131,16 +19276,107 @@
           <a:chExt cx="0" cy="0"/>
         </a:xfrm>
       </p:grpSpPr>
+      <p:sp>
+        <p:nvSpPr>
+          <p:cNvPr id="2" name="Footer Placeholder 1"/>
+          <p:cNvSpPr>
+            <a:spLocks noGrp="1"/>
+          </p:cNvSpPr>
+          <p:nvPr>
+            <p:ph type="ftr" sz="quarter" idx="11"/>
+          </p:nvPr>
+        </p:nvSpPr>
+        <p:spPr/>
+        <p:txBody>
+          <a:bodyPr/>
+          <a:lstStyle/>
+          <a:p>
+            <a:r>
+              <a:rPr lang="en-JM" dirty="0" smtClean="0"/>
+              <a:t>WWW.MMBJ.COM</a:t>
+            </a:r>
+            <a:endParaRPr lang="en-JM" dirty="0"/>
+          </a:p>
+        </p:txBody>
+      </p:sp>
+      <p:sp>
+        <p:nvSpPr>
+          <p:cNvPr id="3" name="Slide Number Placeholder 2"/>
+          <p:cNvSpPr>
+            <a:spLocks noGrp="1"/>
+          </p:cNvSpPr>
+          <p:nvPr>
+            <p:ph type="sldNum" sz="quarter" idx="12"/>
+          </p:nvPr>
+        </p:nvSpPr>
+        <p:spPr/>
+        <p:txBody>
+          <a:bodyPr/>
+          <a:lstStyle/>
+          <a:p>
+            <a:fld id="{857B18ED-D931-45F4-8873-1BEDAB4DC03E}" type="slidenum">
+              <a:rPr lang="en-JM" smtClean="0"/>
+              <a:t>14</a:t>
+            </a:fld>
+            <a:endParaRPr lang="en-JM"/>
+          </a:p>
+        </p:txBody>
+      </p:sp>
+      <p:sp>
+        <p:nvSpPr>
+          <p:cNvPr id="5" name="Title 4"/>
+          <p:cNvSpPr>
+            <a:spLocks noGrp="1"/>
+          </p:cNvSpPr>
+          <p:nvPr>
+            <p:ph type="title" idx="4294967295"/>
+          </p:nvPr>
+        </p:nvSpPr>
+        <p:spPr>
+          <a:xfrm>
+            <a:off x="457200" y="4267200"/>
+            <a:ext cx="8229600" cy="1143000"/>
+          </a:xfrm>
+        </p:spPr>
+        <p:txBody>
+          <a:bodyPr>
+            <a:normAutofit/>
+          </a:bodyPr>
+          <a:lstStyle/>
+          <a:p>
+            <a:r>
+              <a:rPr lang="en-JM" sz="4000" dirty="0" smtClean="0"/>
+              <a:t> </a:t>
+            </a:r>
+            <a:r>
+              <a:rPr lang="en-JM" sz="4000" dirty="0" smtClean="0">
+                <a:solidFill>
+                  <a:schemeClr val="tx1"/>
+                </a:solidFill>
+              </a:rPr>
+              <a:t>Questions or Comments?</a:t>
+            </a:r>
+            <a:endParaRPr lang="en-JM" sz="4000" dirty="0">
+              <a:solidFill>
+                <a:schemeClr val="tx1"/>
+              </a:solidFill>
+              <a:latin typeface="Open Sans Light" pitchFamily="34" charset="0"/>
+              <a:ea typeface="Open Sans Light" pitchFamily="34" charset="0"/>
+              <a:cs typeface="Open Sans Light" pitchFamily="34" charset="0"/>
+            </a:endParaRPr>
+          </a:p>
+        </p:txBody>
+      </p:sp>
       <p:pic>
         <p:nvPicPr>
-          <p:cNvPr id="42" name="Picture 41"/>
+          <p:cNvPr id="4" name="Picture 3"/>
           <p:cNvPicPr>
             <a:picLocks noChangeAspect="1"/>
           </p:cNvPicPr>
           <p:nvPr/>
         </p:nvPicPr>
         <p:blipFill>
-          <a:blip r:embed="rId2" cstate="print">
+          <a:blip r:embed="rId2">
             <a:extLst>
               <a:ext uri="{28A0092B-C50C-407E-A947-70E740481C1C}">
                 <a14:useLocalDpi xmlns:a14="http://schemas.microsoft.com/office/drawing/2010/main" val="0"/>
@@ -19153,407 +19389,14 @@
         </p:blipFill>
         <p:spPr>
           <a:xfrm>
-            <a:off x="6908440" y="1905000"/>
-            <a:ext cx="1778360" cy="3358242"/>
+            <a:off x="1066800" y="1066800"/>
+            <a:ext cx="7010400" cy="2953165"/>
           </a:xfrm>
           <a:prstGeom prst="rect">
             <a:avLst/>
           </a:prstGeom>
         </p:spPr>
       </p:pic>
-      <p:pic>
-        <p:nvPicPr>
-          <p:cNvPr id="43" name="Picture 42" descr="iMac-mock-up-diferents-views.png"/>
-          <p:cNvPicPr>
-            <a:picLocks noChangeAspect="1"/>
-          </p:cNvPicPr>
-          <p:nvPr/>
-        </p:nvPicPr>
-        <p:blipFill>
-          <a:blip r:embed="rId3">
-            <a:extLst>
-              <a:ext uri="{28A0092B-C50C-407E-A947-70E740481C1C}">
-                <a14:useLocalDpi xmlns:a14="http://schemas.microsoft.com/office/drawing/2010/main" val="0"/>
-              </a:ext>
-            </a:extLst>
-          </a:blip>
-          <a:stretch>
-            <a:fillRect/>
-          </a:stretch>
-        </p:blipFill>
-        <p:spPr>
-          <a:xfrm>
-            <a:off x="363348" y="1938866"/>
-            <a:ext cx="3901032" cy="3242733"/>
-          </a:xfrm>
-          <a:prstGeom prst="rect">
-            <a:avLst/>
-          </a:prstGeom>
-        </p:spPr>
-      </p:pic>
-      <p:pic>
-        <p:nvPicPr>
-          <p:cNvPr id="44" name="Picture 43"/>
-          <p:cNvPicPr>
-            <a:picLocks noChangeAspect="1"/>
-          </p:cNvPicPr>
-          <p:nvPr/>
-        </p:nvPicPr>
-        <p:blipFill>
-          <a:blip r:embed="rId4" cstate="print">
-            <a:extLst>
-              <a:ext uri="{28A0092B-C50C-407E-A947-70E740481C1C}">
-                <a14:useLocalDpi xmlns:a14="http://schemas.microsoft.com/office/drawing/2010/main" val="0"/>
-              </a:ext>
-            </a:extLst>
-          </a:blip>
-          <a:stretch>
-            <a:fillRect/>
-          </a:stretch>
-        </p:blipFill>
-        <p:spPr>
-          <a:xfrm>
-            <a:off x="4306900" y="1834242"/>
-            <a:ext cx="2423740" cy="3429000"/>
-          </a:xfrm>
-          <a:prstGeom prst="rect">
-            <a:avLst/>
-          </a:prstGeom>
-        </p:spPr>
-      </p:pic>
-      <p:sp>
-        <p:nvSpPr>
-          <p:cNvPr id="3" name="Footer Placeholder 2"/>
-          <p:cNvSpPr>
-            <a:spLocks noGrp="1"/>
-          </p:cNvSpPr>
-          <p:nvPr>
-            <p:ph type="ftr" sz="quarter" idx="11"/>
-          </p:nvPr>
-        </p:nvSpPr>
-        <p:spPr/>
-        <p:txBody>
-          <a:bodyPr/>
-          <a:lstStyle/>
-          <a:p>
-            <a:r>
-              <a:rPr lang="en-JM" smtClean="0"/>
-              <a:t>WWW.DESIGNERSPARADISE.COM</a:t>
-            </a:r>
-            <a:endParaRPr lang="en-JM"/>
-          </a:p>
-        </p:txBody>
-      </p:sp>
-      <p:sp>
-        <p:nvSpPr>
-          <p:cNvPr id="4" name="Slide Number Placeholder 3"/>
-          <p:cNvSpPr>
-            <a:spLocks noGrp="1"/>
-          </p:cNvSpPr>
-          <p:nvPr>
-            <p:ph type="sldNum" sz="quarter" idx="12"/>
-          </p:nvPr>
-        </p:nvSpPr>
-        <p:spPr/>
-        <p:txBody>
-          <a:bodyPr/>
-          <a:lstStyle/>
-          <a:p>
-            <a:fld id="{857B18ED-D931-45F4-8873-1BEDAB4DC03E}" type="slidenum">
-              <a:rPr lang="en-JM" smtClean="0"/>
-              <a:t>14</a:t>
-            </a:fld>
-            <a:endParaRPr lang="en-JM"/>
-          </a:p>
-        </p:txBody>
-      </p:sp>
-      <p:pic>
-        <p:nvPicPr>
-          <p:cNvPr id="19" name="Picture Placeholder 18"/>
-          <p:cNvPicPr>
-            <a:picLocks noGrp="1" noChangeAspect="1"/>
-          </p:cNvPicPr>
-          <p:nvPr>
-            <p:ph type="pic" sz="quarter" idx="4294967295"/>
-          </p:nvPr>
-        </p:nvPicPr>
-        <p:blipFill>
-          <a:blip r:embed="rId5" cstate="print">
-            <a:extLst>
-              <a:ext uri="{28A0092B-C50C-407E-A947-70E740481C1C}">
-                <a14:useLocalDpi xmlns:a14="http://schemas.microsoft.com/office/drawing/2010/main" val="0"/>
-              </a:ext>
-            </a:extLst>
-          </a:blip>
-          <a:srcRect l="2334" r="2334"/>
-          <a:stretch>
-            <a:fillRect/>
-          </a:stretch>
-        </p:blipFill>
-        <p:spPr>
-          <a:xfrm>
-            <a:off x="609043" y="2133600"/>
-            <a:ext cx="3429000" cy="2133600"/>
-          </a:xfrm>
-        </p:spPr>
-      </p:pic>
-      <p:pic>
-        <p:nvPicPr>
-          <p:cNvPr id="35" name="Picture Placeholder 34"/>
-          <p:cNvPicPr>
-            <a:picLocks noGrp="1" noChangeAspect="1"/>
-          </p:cNvPicPr>
-          <p:nvPr>
-            <p:ph type="pic" sz="quarter" idx="4294967295"/>
-          </p:nvPr>
-        </p:nvPicPr>
-        <p:blipFill>
-          <a:blip r:embed="rId6" cstate="print">
-            <a:extLst>
-              <a:ext uri="{28A0092B-C50C-407E-A947-70E740481C1C}">
-                <a14:useLocalDpi xmlns:a14="http://schemas.microsoft.com/office/drawing/2010/main" val="0"/>
-              </a:ext>
-            </a:extLst>
-          </a:blip>
-          <a:srcRect l="70" r="70"/>
-          <a:stretch>
-            <a:fillRect/>
-          </a:stretch>
-        </p:blipFill>
-        <p:spPr>
-          <a:xfrm>
-            <a:off x="7147235" y="2458952"/>
-            <a:ext cx="1234765" cy="2179579"/>
-          </a:xfrm>
-        </p:spPr>
-      </p:pic>
-      <p:pic>
-        <p:nvPicPr>
-          <p:cNvPr id="41" name="Picture Placeholder 40"/>
-          <p:cNvPicPr>
-            <a:picLocks noGrp="1" noChangeAspect="1"/>
-          </p:cNvPicPr>
-          <p:nvPr>
-            <p:ph type="pic" sz="quarter" idx="4294967295"/>
-          </p:nvPr>
-        </p:nvPicPr>
-        <p:blipFill>
-          <a:blip r:embed="rId7" cstate="print">
-            <a:extLst>
-              <a:ext uri="{28A0092B-C50C-407E-A947-70E740481C1C}">
-                <a14:useLocalDpi xmlns:a14="http://schemas.microsoft.com/office/drawing/2010/main" val="0"/>
-              </a:ext>
-            </a:extLst>
-          </a:blip>
-          <a:srcRect l="667" r="667"/>
-          <a:stretch>
-            <a:fillRect/>
-          </a:stretch>
-        </p:blipFill>
-        <p:spPr>
-          <a:xfrm>
-            <a:off x="4648200" y="2211179"/>
-            <a:ext cx="1828800" cy="2484438"/>
-          </a:xfrm>
-        </p:spPr>
-      </p:pic>
-      <p:sp>
-        <p:nvSpPr>
-          <p:cNvPr id="45" name="Title 1"/>
-          <p:cNvSpPr txBox="1">
-            <a:spLocks/>
-          </p:cNvSpPr>
-          <p:nvPr/>
-        </p:nvSpPr>
-        <p:spPr>
-          <a:xfrm>
-            <a:off x="457200" y="355600"/>
-            <a:ext cx="8229600" cy="1143000"/>
-          </a:xfrm>
-          <a:prstGeom prst="rect">
-            <a:avLst/>
-          </a:prstGeom>
-        </p:spPr>
-        <p:txBody>
-          <a:bodyPr>
-            <a:normAutofit/>
-          </a:bodyPr>
-          <a:lstStyle>
-            <a:lvl1pPr algn="ctr" defTabSz="914400" rtl="0" eaLnBrk="1" latinLnBrk="0" hangingPunct="1">
-              <a:spcBef>
-                <a:spcPct val="0"/>
-              </a:spcBef>
-              <a:buNone/>
-              <a:defRPr sz="4400" kern="1200">
-                <a:solidFill>
-                  <a:schemeClr val="tx1">
-                    <a:lumMod val="85000"/>
-                    <a:lumOff val="15000"/>
-                  </a:schemeClr>
-                </a:solidFill>
-                <a:latin typeface="Open Sans Extrabold" pitchFamily="34" charset="0"/>
-                <a:ea typeface="Open Sans Extrabold" pitchFamily="34" charset="0"/>
-                <a:cs typeface="Open Sans Extrabold" pitchFamily="34" charset="0"/>
-              </a:defRPr>
-            </a:lvl1pPr>
-          </a:lstStyle>
-          <a:p>
-            <a:r>
-              <a:rPr lang="en-JM" dirty="0" smtClean="0">
-                <a:solidFill>
-                  <a:srgbClr val="00B0F0"/>
-                </a:solidFill>
-              </a:rPr>
-              <a:t>Responsive Design</a:t>
-            </a:r>
-            <a:endParaRPr lang="en-JM" dirty="0">
-              <a:latin typeface="Open Sans Light" pitchFamily="34" charset="0"/>
-              <a:ea typeface="Open Sans Light" pitchFamily="34" charset="0"/>
-              <a:cs typeface="Open Sans Light" pitchFamily="34" charset="0"/>
-            </a:endParaRPr>
-          </a:p>
-        </p:txBody>
-      </p:sp>
-    </p:spTree>
-    <p:extLst>
-      <p:ext uri="{BB962C8B-B14F-4D97-AF65-F5344CB8AC3E}">
-        <p14:creationId xmlns:p14="http://schemas.microsoft.com/office/powerpoint/2010/main" val="1279697349"/>
-      </p:ext>
-    </p:extLst>
-  </p:cSld>
-  <p:clrMapOvr>
-    <a:masterClrMapping/>
-  </p:clrMapOvr>
-  <mc:AlternateContent xmlns:mc="http://schemas.openxmlformats.org/markup-compatibility/2006" xmlns:p14="http://schemas.microsoft.com/office/powerpoint/2010/main">
-    <mc:Choice Requires="p14">
-      <p:transition spd="slow" p14:dur="1250">
-        <p14:flythrough/>
-      </p:transition>
-    </mc:Choice>
-    <mc:Fallback xmlns="">
-      <p:transition spd="slow">
-        <p:fade/>
-      </p:transition>
-    </mc:Fallback>
-  </mc:AlternateContent>
-  <p:timing>
-    <p:tnLst>
-      <p:par>
-        <p:cTn id="1" dur="indefinite" restart="never" nodeType="tmRoot"/>
-      </p:par>
-    </p:tnLst>
-  </p:timing>
-</p:sld>
-</file>
-
-<file path=ppt/slides/slide15.xml><?xml version="1.0" encoding="utf-8"?>
-<p:sld xmlns:a="http://schemas.openxmlformats.org/drawingml/2006/main" xmlns:r="http://schemas.openxmlformats.org/officeDocument/2006/relationships" xmlns:p="http://schemas.openxmlformats.org/presentationml/2006/main">
-  <p:cSld>
-    <p:spTree>
-      <p:nvGrpSpPr>
-        <p:cNvPr id="1" name=""/>
-        <p:cNvGrpSpPr/>
-        <p:nvPr/>
-      </p:nvGrpSpPr>
-      <p:grpSpPr>
-        <a:xfrm>
-          <a:off x="0" y="0"/>
-          <a:ext cx="0" cy="0"/>
-          <a:chOff x="0" y="0"/>
-          <a:chExt cx="0" cy="0"/>
-        </a:xfrm>
-      </p:grpSpPr>
-      <p:sp>
-        <p:nvSpPr>
-          <p:cNvPr id="2" name="Footer Placeholder 1"/>
-          <p:cNvSpPr>
-            <a:spLocks noGrp="1"/>
-          </p:cNvSpPr>
-          <p:nvPr>
-            <p:ph type="ftr" sz="quarter" idx="11"/>
-          </p:nvPr>
-        </p:nvSpPr>
-        <p:spPr/>
-        <p:txBody>
-          <a:bodyPr/>
-          <a:lstStyle/>
-          <a:p>
-            <a:r>
-              <a:rPr lang="en-JM" dirty="0" smtClean="0"/>
-              <a:t>WWW.MMBJ.COM</a:t>
-            </a:r>
-            <a:endParaRPr lang="en-JM" dirty="0"/>
-          </a:p>
-        </p:txBody>
-      </p:sp>
-      <p:sp>
-        <p:nvSpPr>
-          <p:cNvPr id="3" name="Slide Number Placeholder 2"/>
-          <p:cNvSpPr>
-            <a:spLocks noGrp="1"/>
-          </p:cNvSpPr>
-          <p:nvPr>
-            <p:ph type="sldNum" sz="quarter" idx="12"/>
-          </p:nvPr>
-        </p:nvSpPr>
-        <p:spPr/>
-        <p:txBody>
-          <a:bodyPr/>
-          <a:lstStyle/>
-          <a:p>
-            <a:fld id="{857B18ED-D931-45F4-8873-1BEDAB4DC03E}" type="slidenum">
-              <a:rPr lang="en-JM" smtClean="0"/>
-              <a:t>15</a:t>
-            </a:fld>
-            <a:endParaRPr lang="en-JM"/>
-          </a:p>
-        </p:txBody>
-      </p:sp>
-      <p:sp>
-        <p:nvSpPr>
-          <p:cNvPr id="5" name="Title 4"/>
-          <p:cNvSpPr>
-            <a:spLocks noGrp="1"/>
-          </p:cNvSpPr>
-          <p:nvPr>
-            <p:ph type="title" idx="4294967295"/>
-          </p:nvPr>
-        </p:nvSpPr>
-        <p:spPr>
-          <a:xfrm>
-            <a:off x="457200" y="4267200"/>
-            <a:ext cx="8229600" cy="1143000"/>
-          </a:xfrm>
-        </p:spPr>
-        <p:txBody>
-          <a:bodyPr>
-            <a:normAutofit/>
-          </a:bodyPr>
-          <a:lstStyle/>
-          <a:p>
-            <a:r>
-              <a:rPr lang="en-JM" sz="4000" dirty="0" smtClean="0"/>
-              <a:t> </a:t>
-            </a:r>
-            <a:r>
-              <a:rPr lang="en-JM" sz="4000" dirty="0" smtClean="0">
-                <a:solidFill>
-                  <a:schemeClr val="accent1"/>
-                </a:solidFill>
-              </a:rPr>
-              <a:t>Questions/Comments!</a:t>
-            </a:r>
-            <a:endParaRPr lang="en-JM" sz="4000" dirty="0">
-              <a:solidFill>
-                <a:schemeClr val="accent1"/>
-              </a:solidFill>
-              <a:latin typeface="Open Sans Light" pitchFamily="34" charset="0"/>
-              <a:ea typeface="Open Sans Light" pitchFamily="34" charset="0"/>
-              <a:cs typeface="Open Sans Light" pitchFamily="34" charset="0"/>
-            </a:endParaRPr>
-          </a:p>
-        </p:txBody>
-      </p:sp>
     </p:spTree>
     <p:extLst>
       <p:ext uri="{BB962C8B-B14F-4D97-AF65-F5344CB8AC3E}">
@@ -19623,17 +19466,14 @@
             <a:r>
               <a:rPr lang="en-JM" sz="4400" dirty="0" smtClean="0">
                 <a:solidFill>
-                  <a:srgbClr val="00B0F0"/>
+                  <a:srgbClr val="2F74C3"/>
                 </a:solidFill>
               </a:rPr>
               <a:t>The MMBJ Team</a:t>
             </a:r>
             <a:endParaRPr lang="en-JM" sz="4400" dirty="0">
               <a:solidFill>
-                <a:schemeClr val="tx1">
-                  <a:lumMod val="85000"/>
-                  <a:lumOff val="15000"/>
-                </a:schemeClr>
+                <a:srgbClr val="2F74C3"/>
               </a:solidFill>
               <a:latin typeface="Open Sans Light" pitchFamily="34" charset="0"/>
               <a:ea typeface="Open Sans Light" pitchFamily="34" charset="0"/>
@@ -19665,6 +19505,10 @@
             <a:r>
               <a:rPr lang="en-JM" sz="1600" dirty="0" err="1" smtClean="0"/>
               <a:t>Megha</a:t>
+            </a:r>
+            <a:r>
+              <a:rPr lang="en-JM" sz="1600" dirty="0" smtClean="0"/>
+              <a:t> Patel</a:t>
             </a:r>
             <a:endParaRPr lang="en-JM" sz="1600" dirty="0">
               <a:solidFill>
@@ -19706,7 +19550,7 @@
                   </a:schemeClr>
                 </a:solidFill>
               </a:rPr>
-              <a:t>Brian</a:t>
+              <a:t>Brian Peng</a:t>
             </a:r>
             <a:endParaRPr lang="en-JM" sz="1600" dirty="0">
               <a:solidFill>
@@ -19731,8 +19575,8 @@
         </p:nvSpPr>
         <p:spPr>
           <a:xfrm>
-            <a:off x="6858000" y="4038600"/>
-            <a:ext cx="1677924" cy="406400"/>
+            <a:off x="6819900" y="4038600"/>
+            <a:ext cx="1905000" cy="406400"/>
           </a:xfrm>
         </p:spPr>
         <p:txBody>
@@ -19741,7 +19585,7 @@
           <a:p>
             <a:r>
               <a:rPr lang="en-JM" sz="1600" dirty="0" smtClean="0"/>
-              <a:t>Mahmood</a:t>
+              <a:t>Mahmood Qureshi</a:t>
             </a:r>
             <a:endParaRPr lang="en-JM" sz="1600" dirty="0">
               <a:solidFill>
@@ -19776,7 +19620,7 @@
           <a:p>
             <a:r>
               <a:rPr lang="en-JM" sz="1600" dirty="0" smtClean="0"/>
-              <a:t>John</a:t>
+              <a:t>John Nguyen</a:t>
             </a:r>
             <a:endParaRPr lang="en-JM" sz="1600" dirty="0">
               <a:solidFill>
@@ -19801,7 +19645,7 @@
         </p:nvSpPr>
         <p:spPr>
           <a:xfrm>
-            <a:off x="2781300" y="4495800"/>
+            <a:off x="2670235" y="4495800"/>
             <a:ext cx="1981200" cy="406400"/>
           </a:xfrm>
         </p:spPr>
@@ -19812,17 +19656,76 @@
             <a:r>
               <a:rPr lang="en-JM" dirty="0" smtClean="0">
                 <a:solidFill>
-                  <a:srgbClr val="00B0F0"/>
+                  <a:srgbClr val="2F74C3"/>
                 </a:solidFill>
               </a:rPr>
-              <a:t>Software developer</a:t>
-            </a:r>
+              <a:t>Software </a:t>
+            </a:r>
+            <a:r>
+              <a:rPr lang="en-JM" dirty="0" smtClean="0">
+                <a:solidFill>
+                  <a:srgbClr val="2F74C3"/>
+                </a:solidFill>
+              </a:rPr>
+              <a:t>Developer</a:t>
+            </a:r>
+            <a:endParaRPr lang="en-JM" dirty="0">
+              <a:solidFill>
+                <a:srgbClr val="2F74C3"/>
+              </a:solidFill>
+            </a:endParaRPr>
+          </a:p>
+          <a:p>
             <a:endParaRPr lang="en-JM" dirty="0">
               <a:solidFill>
                 <a:srgbClr val="00B0F0"/>
               </a:solidFill>
             </a:endParaRPr>
           </a:p>
+        </p:txBody>
+      </p:sp>
+      <p:sp>
+        <p:nvSpPr>
+          <p:cNvPr id="12" name="Text Placeholder 11"/>
+          <p:cNvSpPr>
+            <a:spLocks noGrp="1"/>
+          </p:cNvSpPr>
+          <p:nvPr>
+            <p:ph type="body" sz="quarter" idx="58"/>
+          </p:nvPr>
+        </p:nvSpPr>
+        <p:spPr>
+          <a:xfrm>
+            <a:off x="4721165" y="4495800"/>
+            <a:ext cx="1981200" cy="406400"/>
+          </a:xfrm>
+        </p:spPr>
+        <p:txBody>
+          <a:bodyPr/>
+          <a:lstStyle/>
+          <a:p>
+            <a:r>
+              <a:rPr lang="en-JM" dirty="0">
+                <a:solidFill>
+                  <a:srgbClr val="2F74C3"/>
+                </a:solidFill>
+              </a:rPr>
+              <a:t>Software </a:t>
+            </a:r>
+            <a:r>
+              <a:rPr lang="en-JM" dirty="0" smtClean="0">
+                <a:solidFill>
+                  <a:srgbClr val="2F74C3"/>
+                </a:solidFill>
+              </a:rPr>
+              <a:t>Developer</a:t>
+            </a:r>
+            <a:endParaRPr lang="en-JM" dirty="0">
+              <a:solidFill>
+                <a:srgbClr val="2F74C3"/>
+              </a:solidFill>
+            </a:endParaRPr>
+          </a:p>
           <a:p>
             <a:endParaRPr lang="en-JM" dirty="0">
               <a:solidFill>
@@ -19834,17 +19737,17 @@
       </p:sp>
       <p:sp>
         <p:nvSpPr>
-          <p:cNvPr id="12" name="Text Placeholder 11"/>
-          <p:cNvSpPr>
-            <a:spLocks noGrp="1"/>
-          </p:cNvSpPr>
-          <p:nvPr>
-            <p:ph type="body" sz="quarter" idx="58"/>
-          </p:nvPr>
-        </p:nvSpPr>
-        <p:spPr>
-          <a:xfrm>
-            <a:off x="4799076" y="4495800"/>
+          <p:cNvPr id="13" name="Text Placeholder 12"/>
+          <p:cNvSpPr>
+            <a:spLocks noGrp="1"/>
+          </p:cNvSpPr>
+          <p:nvPr>
+            <p:ph type="body" sz="quarter" idx="59"/>
+          </p:nvPr>
+        </p:nvSpPr>
+        <p:spPr>
+          <a:xfrm>
+            <a:off x="6772095" y="4491522"/>
             <a:ext cx="1981200" cy="406400"/>
           </a:xfrm>
         </p:spPr>
@@ -19853,9 +19756,26 @@
           <a:lstStyle/>
           <a:p>
             <a:r>
-              <a:rPr lang="en-JM" dirty="0"/>
-              <a:t>Software developer</a:t>
-            </a:r>
+              <a:rPr lang="en-JM" dirty="0">
+                <a:solidFill>
+                  <a:srgbClr val="2F74C3"/>
+                </a:solidFill>
+              </a:rPr>
+              <a:t>Software </a:t>
+            </a:r>
+            <a:r>
+              <a:rPr lang="en-JM" dirty="0" smtClean="0">
+                <a:solidFill>
+                  <a:srgbClr val="2F74C3"/>
+                </a:solidFill>
+              </a:rPr>
+              <a:t>Developer</a:t>
+            </a:r>
+            <a:endParaRPr lang="en-JM" dirty="0">
+              <a:solidFill>
+                <a:srgbClr val="2F74C3"/>
+              </a:solidFill>
+            </a:endParaRPr>
           </a:p>
           <a:p>
             <a:endParaRPr lang="en-JM" dirty="0">
@@ -19868,17 +19788,17 @@
       </p:sp>
       <p:sp>
         <p:nvSpPr>
-          <p:cNvPr id="13" name="Text Placeholder 12"/>
-          <p:cNvSpPr>
-            <a:spLocks noGrp="1"/>
-          </p:cNvSpPr>
-          <p:nvPr>
-            <p:ph type="body" sz="quarter" idx="59"/>
-          </p:nvPr>
-        </p:nvSpPr>
-        <p:spPr>
-          <a:xfrm>
-            <a:off x="6781800" y="4495800"/>
+          <p:cNvPr id="14" name="Text Placeholder 13"/>
+          <p:cNvSpPr>
+            <a:spLocks noGrp="1"/>
+          </p:cNvSpPr>
+          <p:nvPr>
+            <p:ph type="body" sz="quarter" idx="60"/>
+          </p:nvPr>
+        </p:nvSpPr>
+        <p:spPr>
+          <a:xfrm>
+            <a:off x="609600" y="4495800"/>
             <a:ext cx="1981200" cy="406400"/>
           </a:xfrm>
         </p:spPr>
@@ -19887,9 +19807,18 @@
           <a:lstStyle/>
           <a:p>
             <a:r>
-              <a:rPr lang="en-JM" dirty="0"/>
-              <a:t>Software developer</a:t>
-            </a:r>
+              <a:rPr lang="en-JM" dirty="0" smtClean="0">
+                <a:solidFill>
+                  <a:srgbClr val="2F74C3"/>
+                </a:solidFill>
+              </a:rPr>
+              <a:t>Team Lead</a:t>
+            </a:r>
+            <a:endParaRPr lang="en-JM" dirty="0">
+              <a:solidFill>
+                <a:srgbClr val="2F74C3"/>
+              </a:solidFill>
+            </a:endParaRPr>
           </a:p>
           <a:p>
             <a:endParaRPr lang="en-JM" dirty="0">
@@ -19902,62 +19831,36 @@
       </p:sp>
       <p:sp>
         <p:nvSpPr>
-          <p:cNvPr id="14" name="Text Placeholder 13"/>
-          <p:cNvSpPr>
-            <a:spLocks noGrp="1"/>
-          </p:cNvSpPr>
-          <p:nvPr>
-            <p:ph type="body" sz="quarter" idx="60"/>
-          </p:nvPr>
-        </p:nvSpPr>
-        <p:spPr>
-          <a:xfrm>
-            <a:off x="685800" y="4495800"/>
-            <a:ext cx="1981200" cy="406400"/>
+          <p:cNvPr id="18" name="Text Placeholder 17"/>
+          <p:cNvSpPr>
+            <a:spLocks noGrp="1"/>
+          </p:cNvSpPr>
+          <p:nvPr>
+            <p:ph type="body" sz="quarter" idx="64"/>
+          </p:nvPr>
+        </p:nvSpPr>
+        <p:spPr>
+          <a:xfrm>
+            <a:off x="733964" y="5009006"/>
+            <a:ext cx="7800436" cy="845693"/>
           </a:xfrm>
         </p:spPr>
         <p:txBody>
           <a:bodyPr/>
           <a:lstStyle/>
           <a:p>
-            <a:r>
-              <a:rPr lang="en-JM" dirty="0" smtClean="0">
-                <a:solidFill>
-                  <a:srgbClr val="00B0F0"/>
+            <a:pPr algn="l"/>
+            <a:r>
+              <a:rPr lang="en-JM" sz="1300" dirty="0" smtClean="0">
+                <a:solidFill>
+                  <a:schemeClr val="tx1">
+                    <a:lumMod val="65000"/>
+                    <a:lumOff val="35000"/>
+                  </a:schemeClr>
                 </a:solidFill>
               </a:rPr>
-              <a:t>Team Lead</a:t>
-            </a:r>
-            <a:endParaRPr lang="en-JM" dirty="0">
-              <a:solidFill>
-                <a:srgbClr val="00B0F0"/>
-              </a:solidFill>
-            </a:endParaRPr>
-          </a:p>
-          <a:p>
-            <a:endParaRPr lang="en-JM" dirty="0">
-              <a:solidFill>
-                <a:srgbClr val="00B0F0"/>
-              </a:solidFill>
-            </a:endParaRPr>
-          </a:p>
-        </p:txBody>
-      </p:sp>
-      <p:sp>
-        <p:nvSpPr>
-          <p:cNvPr id="15" name="Text Placeholder 14"/>
-          <p:cNvSpPr>
-            <a:spLocks noGrp="1"/>
-          </p:cNvSpPr>
-          <p:nvPr>
-            <p:ph type="body" sz="quarter" idx="61"/>
-          </p:nvPr>
-        </p:nvSpPr>
-        <p:spPr/>
-        <p:txBody>
-          <a:bodyPr/>
-          <a:lstStyle/>
-          <a:p>
+              <a:t>MMBJ Development Inc. has over 35 years of software development experience and have developed software solutions for companies in industries such as finance, education, and tourism industries. We specialize on complete software and hardware solutions to ensure all of your requirements are met.</a:t>
+            </a:r>
             <a:endParaRPr lang="en-JM" sz="1300" dirty="0">
               <a:solidFill>
                 <a:schemeClr val="tx1">
@@ -19971,84 +19874,6 @@
       </p:sp>
       <p:sp>
         <p:nvSpPr>
-          <p:cNvPr id="16" name="Text Placeholder 15"/>
-          <p:cNvSpPr>
-            <a:spLocks noGrp="1"/>
-          </p:cNvSpPr>
-          <p:nvPr>
-            <p:ph type="body" sz="quarter" idx="62"/>
-          </p:nvPr>
-        </p:nvSpPr>
-        <p:spPr/>
-        <p:txBody>
-          <a:bodyPr/>
-          <a:lstStyle/>
-          <a:p>
-            <a:endParaRPr lang="en-JM" sz="1300" dirty="0">
-              <a:solidFill>
-                <a:schemeClr val="tx1">
-                  <a:lumMod val="65000"/>
-                  <a:lumOff val="35000"/>
-                </a:schemeClr>
-              </a:solidFill>
-            </a:endParaRPr>
-          </a:p>
-        </p:txBody>
-      </p:sp>
-      <p:sp>
-        <p:nvSpPr>
-          <p:cNvPr id="17" name="Text Placeholder 16"/>
-          <p:cNvSpPr>
-            <a:spLocks noGrp="1"/>
-          </p:cNvSpPr>
-          <p:nvPr>
-            <p:ph type="body" sz="quarter" idx="63"/>
-          </p:nvPr>
-        </p:nvSpPr>
-        <p:spPr/>
-        <p:txBody>
-          <a:bodyPr/>
-          <a:lstStyle/>
-          <a:p>
-            <a:endParaRPr lang="en-JM" sz="1300" dirty="0">
-              <a:solidFill>
-                <a:schemeClr val="tx1">
-                  <a:lumMod val="65000"/>
-                  <a:lumOff val="35000"/>
-                </a:schemeClr>
-              </a:solidFill>
-            </a:endParaRPr>
-          </a:p>
-        </p:txBody>
-      </p:sp>
-      <p:sp>
-        <p:nvSpPr>
-          <p:cNvPr id="18" name="Text Placeholder 17"/>
-          <p:cNvSpPr>
-            <a:spLocks noGrp="1"/>
-          </p:cNvSpPr>
-          <p:nvPr>
-            <p:ph type="body" sz="quarter" idx="64"/>
-          </p:nvPr>
-        </p:nvSpPr>
-        <p:spPr/>
-        <p:txBody>
-          <a:bodyPr/>
-          <a:lstStyle/>
-          <a:p>
-            <a:endParaRPr lang="en-JM" sz="1300" dirty="0">
-              <a:solidFill>
-                <a:schemeClr val="tx1">
-                  <a:lumMod val="65000"/>
-                  <a:lumOff val="35000"/>
-                </a:schemeClr>
-              </a:solidFill>
-            </a:endParaRPr>
-          </a:p>
-        </p:txBody>
-      </p:sp>
-      <p:sp>
-        <p:nvSpPr>
           <p:cNvPr id="23" name="Slide Number Placeholder 22"/>
           <p:cNvSpPr>
             <a:spLocks noGrp="1"/>
@@ -20103,7 +19928,7 @@
             <p:ph type="pic" sz="quarter" idx="50"/>
           </p:nvPr>
         </p:nvPicPr>
-        <p:blipFill>
+        <p:blipFill rotWithShape="1">
           <a:blip r:embed="rId2" cstate="print">
             <a:extLst>
               <a:ext uri="{28A0092B-C50C-407E-A947-70E740481C1C}">
@@ -20111,12 +19936,15 @@
               </a:ext>
             </a:extLst>
           </a:blip>
-          <a:srcRect t="12500" b="12500"/>
-          <a:stretch>
-            <a:fillRect/>
-          </a:stretch>
+          <a:srcRect l="6122" t="26714" r="8164" b="9000"/>
+          <a:stretch/>
         </p:blipFill>
-        <p:spPr/>
+        <p:spPr>
+          <a:xfrm>
+            <a:off x="800100" y="1960353"/>
+            <a:ext cx="1600200" cy="1600200"/>
+          </a:xfrm>
+        </p:spPr>
       </p:pic>
       <p:pic>
         <p:nvPicPr>
@@ -20128,7 +19956,7 @@
             <p:ph type="pic" sz="quarter" idx="51"/>
           </p:nvPr>
         </p:nvPicPr>
-        <p:blipFill>
+        <p:blipFill rotWithShape="1">
           <a:blip r:embed="rId3" cstate="print">
             <a:extLst>
               <a:ext uri="{28A0092B-C50C-407E-A947-70E740481C1C}">
@@ -20136,10 +19964,8 @@
               </a:ext>
             </a:extLst>
           </a:blip>
-          <a:srcRect t="12500" b="12500"/>
-          <a:stretch>
-            <a:fillRect/>
-          </a:stretch>
+          <a:srcRect l="6667" t="18333" b="11667"/>
+          <a:stretch/>
         </p:blipFill>
         <p:spPr/>
       </p:pic>
@@ -20267,12 +20093,15 @@
             <a:r>
               <a:rPr lang="en-JM" sz="4400" dirty="0" smtClean="0">
                 <a:solidFill>
-                  <a:srgbClr val="00B0F0"/>
+                  <a:srgbClr val="2F74C3"/>
                 </a:solidFill>
               </a:rPr>
               <a:t>Goals</a:t>
             </a:r>
             <a:endParaRPr lang="en-JM" sz="4400" dirty="0">
+              <a:solidFill>
+                <a:srgbClr val="2F74C3"/>
+              </a:solidFill>
               <a:latin typeface="Open Sans Light" pitchFamily="34" charset="0"/>
               <a:ea typeface="Open Sans Light" pitchFamily="34" charset="0"/>
               <a:cs typeface="Open Sans Light" pitchFamily="34" charset="0"/>
@@ -20594,12 +20423,15 @@
             <a:r>
               <a:rPr lang="en-JM" sz="4400" dirty="0" smtClean="0">
                 <a:solidFill>
-                  <a:srgbClr val="00B0F0"/>
+                  <a:srgbClr val="2F74C3"/>
                 </a:solidFill>
               </a:rPr>
               <a:t>Objectives</a:t>
             </a:r>
             <a:endParaRPr lang="en-JM" sz="4400" dirty="0">
+              <a:solidFill>
+                <a:srgbClr val="2F74C3"/>
+              </a:solidFill>
               <a:latin typeface="Open Sans Light" pitchFamily="34" charset="0"/>
               <a:ea typeface="Open Sans Light" pitchFamily="34" charset="0"/>
               <a:cs typeface="Open Sans Light" pitchFamily="34" charset="0"/>
@@ -20948,19 +20780,7 @@
                 </a:solidFill>
                 <a:cs typeface="Calibri"/>
               </a:rPr>
-              <a:t>Users </a:t>
-            </a:r>
-            <a:r>
-              <a:rPr lang="en-JM" sz="1600" dirty="0" smtClean="0">
-                <a:solidFill>
-                  <a:schemeClr val="tx1">
-                    <a:lumMod val="75000"/>
-                    <a:lumOff val="25000"/>
-                  </a:schemeClr>
-                </a:solidFill>
-                <a:cs typeface="Calibri"/>
-              </a:rPr>
-              <a:t>Technical Skills</a:t>
+              <a:t>Users Technical Skills</a:t>
             </a:r>
             <a:endParaRPr lang="en-JM" sz="1600" dirty="0">
               <a:solidFill>
@@ -21006,19 +20826,7 @@
                 </a:solidFill>
                 <a:cs typeface="Calibri"/>
               </a:rPr>
-              <a:t>System </a:t>
-            </a:r>
-            <a:r>
-              <a:rPr lang="en-JM" sz="1600" dirty="0" smtClean="0">
-                <a:solidFill>
-                  <a:schemeClr val="tx1">
-                    <a:lumMod val="75000"/>
-                    <a:lumOff val="25000"/>
-                  </a:schemeClr>
-                </a:solidFill>
-                <a:cs typeface="Calibri"/>
-              </a:rPr>
-              <a:t>Failure</a:t>
+              <a:t>System Failure</a:t>
             </a:r>
             <a:endParaRPr lang="en-JM" sz="1600" dirty="0">
               <a:solidFill>
@@ -21064,19 +20872,7 @@
                 </a:solidFill>
                 <a:cs typeface="Calibri"/>
               </a:rPr>
-              <a:t>Conflicts / </a:t>
-            </a:r>
-            <a:r>
-              <a:rPr lang="en-JM" sz="1600" dirty="0" smtClean="0">
-                <a:solidFill>
-                  <a:schemeClr val="tx1">
-                    <a:lumMod val="75000"/>
-                    <a:lumOff val="25000"/>
-                  </a:schemeClr>
-                </a:solidFill>
-                <a:cs typeface="Calibri"/>
-              </a:rPr>
-              <a:t>Variations</a:t>
+              <a:t>Conflicts / Variations</a:t>
             </a:r>
             <a:endParaRPr lang="en-JM" sz="1600" dirty="0">
               <a:solidFill>
@@ -21255,67 +21051,7 @@
                 </a:solidFill>
                 <a:cs typeface="Calibri"/>
               </a:rPr>
-              <a:t>User </a:t>
-            </a:r>
-            <a:r>
-              <a:rPr lang="en-JM" sz="1600" dirty="0" smtClean="0">
-                <a:solidFill>
-                  <a:schemeClr val="tx1">
-                    <a:lumMod val="75000"/>
-                    <a:lumOff val="25000"/>
-                  </a:schemeClr>
-                </a:solidFill>
-                <a:cs typeface="Calibri"/>
-              </a:rPr>
-              <a:t>Training </a:t>
-            </a:r>
-            <a:r>
-              <a:rPr lang="en-JM" sz="1600" dirty="0" smtClean="0">
-                <a:solidFill>
-                  <a:schemeClr val="tx1">
-                    <a:lumMod val="75000"/>
-                    <a:lumOff val="25000"/>
-                  </a:schemeClr>
-                </a:solidFill>
-                <a:cs typeface="Calibri"/>
-              </a:rPr>
-              <a:t>/ </a:t>
-            </a:r>
-            <a:r>
-              <a:rPr lang="en-JM" sz="1600" dirty="0" smtClean="0">
-                <a:solidFill>
-                  <a:schemeClr val="tx1">
-                    <a:lumMod val="75000"/>
-                    <a:lumOff val="25000"/>
-                  </a:schemeClr>
-                </a:solidFill>
-                <a:cs typeface="Calibri"/>
-              </a:rPr>
-              <a:t>Orientation </a:t>
-            </a:r>
-            <a:r>
-              <a:rPr lang="en-JM" sz="1600" dirty="0" smtClean="0">
-                <a:solidFill>
-                  <a:schemeClr val="tx1">
-                    <a:lumMod val="75000"/>
-                    <a:lumOff val="25000"/>
-                  </a:schemeClr>
-                </a:solidFill>
-                <a:cs typeface="Calibri"/>
-              </a:rPr>
-              <a:t>of </a:t>
-            </a:r>
-            <a:r>
-              <a:rPr lang="en-JM" sz="1600" dirty="0" smtClean="0">
-                <a:solidFill>
-                  <a:schemeClr val="tx1">
-                    <a:lumMod val="75000"/>
-                    <a:lumOff val="25000"/>
-                  </a:schemeClr>
-                </a:solidFill>
-                <a:cs typeface="Calibri"/>
-              </a:rPr>
-              <a:t>System</a:t>
+              <a:t>User Training / Orientation of System</a:t>
             </a:r>
             <a:endParaRPr lang="en-JM" sz="1600" dirty="0">
               <a:solidFill>
@@ -21407,19 +21143,7 @@
                 </a:solidFill>
                 <a:cs typeface="Calibri"/>
               </a:rPr>
-              <a:t>Keep </a:t>
-            </a:r>
-            <a:r>
-              <a:rPr lang="en-JM" sz="1600" dirty="0" smtClean="0">
-                <a:solidFill>
-                  <a:schemeClr val="tx1">
-                    <a:lumMod val="75000"/>
-                    <a:lumOff val="25000"/>
-                  </a:schemeClr>
-                </a:solidFill>
-                <a:cs typeface="Calibri"/>
-              </a:rPr>
-              <a:t>Hard Copies / Maintenance Period</a:t>
+              <a:t>Keep Hard Copies / Maintenance Period</a:t>
             </a:r>
             <a:endParaRPr lang="en-JM" sz="1600" dirty="0">
               <a:solidFill>
@@ -21948,19 +21672,7 @@
                 </a:solidFill>
                 <a:cs typeface="Calibri"/>
               </a:rPr>
-              <a:t>Hosting </a:t>
-            </a:r>
-            <a:r>
-              <a:rPr lang="en-JM" sz="1600" dirty="0" smtClean="0">
-                <a:solidFill>
-                  <a:schemeClr val="tx1">
-                    <a:lumMod val="75000"/>
-                    <a:lumOff val="25000"/>
-                  </a:schemeClr>
-                </a:solidFill>
-                <a:cs typeface="Calibri"/>
-              </a:rPr>
-              <a:t>Options</a:t>
+              <a:t>Hosting Options</a:t>
             </a:r>
             <a:endParaRPr lang="en-JM" sz="1600" dirty="0">
               <a:solidFill>
@@ -22738,7 +22450,16 @@
                 </a:solidFill>
                 <a:cs typeface="Calibri"/>
               </a:rPr>
-              <a:t>Hosting with us</a:t>
+              <a:t>Hosting with </a:t>
+            </a:r>
+            <a:r>
+              <a:rPr lang="en-JM" sz="2000" dirty="0" smtClean="0">
+                <a:solidFill>
+                  <a:schemeClr val="tx2"/>
+                </a:solidFill>
+                <a:cs typeface="Calibri"/>
+              </a:rPr>
+              <a:t>us</a:t>
             </a:r>
             <a:endParaRPr lang="en-JM" sz="2000" dirty="0">
               <a:solidFill>
@@ -22773,6 +22494,36 @@
           </a:p>
         </p:txBody>
       </p:sp>
+      <p:pic>
+        <p:nvPicPr>
+          <p:cNvPr id="6" name="Picture 5"/>
+          <p:cNvPicPr>
+            <a:picLocks noChangeAspect="1"/>
+          </p:cNvPicPr>
+          <p:nvPr/>
+        </p:nvPicPr>
+        <p:blipFill>
+          <a:blip r:embed="rId2">
+            <a:extLst>
+              <a:ext uri="{28A0092B-C50C-407E-A947-70E740481C1C}">
+                <a14:useLocalDpi xmlns:a14="http://schemas.microsoft.com/office/drawing/2010/main" val="0"/>
+              </a:ext>
+            </a:extLst>
+          </a:blip>
+          <a:stretch>
+            <a:fillRect/>
+          </a:stretch>
+        </p:blipFill>
+        <p:spPr>
+          <a:xfrm>
+            <a:off x="5791200" y="2590800"/>
+            <a:ext cx="2590800" cy="2590800"/>
+          </a:xfrm>
+          <a:prstGeom prst="rect">
+            <a:avLst/>
+          </a:prstGeom>
+        </p:spPr>
+      </p:pic>
     </p:spTree>
     <p:extLst>
       <p:ext uri="{BB962C8B-B14F-4D97-AF65-F5344CB8AC3E}">
@@ -23511,27 +23262,7 @@
                 <a:latin typeface="Calibri"/>
                 <a:cs typeface="Calibri"/>
               </a:rPr>
-              <a:t>3 </a:t>
-            </a:r>
-            <a:r>
-              <a:rPr lang="en-JM" sz="2000" dirty="0" smtClean="0">
-                <a:solidFill>
-                  <a:schemeClr val="tx2"/>
-                </a:solidFill>
-                <a:latin typeface="Calibri"/>
-                <a:cs typeface="Calibri"/>
-              </a:rPr>
-              <a:t>month </a:t>
-            </a:r>
-            <a:r>
-              <a:rPr lang="en-JM" sz="2000" dirty="0" smtClean="0">
-                <a:solidFill>
-                  <a:schemeClr val="tx2"/>
-                </a:solidFill>
-                <a:latin typeface="Calibri"/>
-                <a:cs typeface="Calibri"/>
-              </a:rPr>
-              <a:t>maintenance period </a:t>
+              <a:t>3 month maintenance period </a:t>
             </a:r>
           </a:p>
           <a:p>

</xml_diff>